<commit_message>
Added squad eval metrics
</commit_message>
<xml_diff>
--- a/mturk_study/batches/annotation_process.pptx
+++ b/mturk_study/batches/annotation_process.pptx
@@ -46,6 +46,9 @@
     <p:sldId id="424" r:id="rId40"/>
     <p:sldId id="292" r:id="rId41"/>
     <p:sldId id="430" r:id="rId42"/>
+    <p:sldId id="431" r:id="rId43"/>
+    <p:sldId id="432" r:id="rId44"/>
+    <p:sldId id="433" r:id="rId45"/>
   </p:sldIdLst>
   <p:sldSz cx="12192000" cy="6858000"/>
   <p:notesSz cx="6858000" cy="9144000"/>
@@ -299,7 +302,7 @@
           <a:p>
             <a:fld id="{4BE22FE5-10EE-49E1-829B-6CE36DD4136F}" type="datetimeFigureOut">
               <a:rPr lang="en-US" smtClean="0"/>
-              <a:t>9/24/2021</a:t>
+              <a:t>10/11/2021</a:t>
             </a:fld>
             <a:endParaRPr lang="en-US"/>
           </a:p>
@@ -497,7 +500,7 @@
           <a:p>
             <a:fld id="{4BE22FE5-10EE-49E1-829B-6CE36DD4136F}" type="datetimeFigureOut">
               <a:rPr lang="en-US" smtClean="0"/>
-              <a:t>9/24/2021</a:t>
+              <a:t>10/11/2021</a:t>
             </a:fld>
             <a:endParaRPr lang="en-US"/>
           </a:p>
@@ -705,7 +708,7 @@
           <a:p>
             <a:fld id="{4BE22FE5-10EE-49E1-829B-6CE36DD4136F}" type="datetimeFigureOut">
               <a:rPr lang="en-US" smtClean="0"/>
-              <a:t>9/24/2021</a:t>
+              <a:t>10/11/2021</a:t>
             </a:fld>
             <a:endParaRPr lang="en-US"/>
           </a:p>
@@ -903,7 +906,7 @@
           <a:p>
             <a:fld id="{4BE22FE5-10EE-49E1-829B-6CE36DD4136F}" type="datetimeFigureOut">
               <a:rPr lang="en-US" smtClean="0"/>
-              <a:t>9/24/2021</a:t>
+              <a:t>10/11/2021</a:t>
             </a:fld>
             <a:endParaRPr lang="en-US"/>
           </a:p>
@@ -1178,7 +1181,7 @@
           <a:p>
             <a:fld id="{4BE22FE5-10EE-49E1-829B-6CE36DD4136F}" type="datetimeFigureOut">
               <a:rPr lang="en-US" smtClean="0"/>
-              <a:t>9/24/2021</a:t>
+              <a:t>10/11/2021</a:t>
             </a:fld>
             <a:endParaRPr lang="en-US"/>
           </a:p>
@@ -1443,7 +1446,7 @@
           <a:p>
             <a:fld id="{4BE22FE5-10EE-49E1-829B-6CE36DD4136F}" type="datetimeFigureOut">
               <a:rPr lang="en-US" smtClean="0"/>
-              <a:t>9/24/2021</a:t>
+              <a:t>10/11/2021</a:t>
             </a:fld>
             <a:endParaRPr lang="en-US"/>
           </a:p>
@@ -1855,7 +1858,7 @@
           <a:p>
             <a:fld id="{4BE22FE5-10EE-49E1-829B-6CE36DD4136F}" type="datetimeFigureOut">
               <a:rPr lang="en-US" smtClean="0"/>
-              <a:t>9/24/2021</a:t>
+              <a:t>10/11/2021</a:t>
             </a:fld>
             <a:endParaRPr lang="en-US"/>
           </a:p>
@@ -1996,7 +1999,7 @@
           <a:p>
             <a:fld id="{4BE22FE5-10EE-49E1-829B-6CE36DD4136F}" type="datetimeFigureOut">
               <a:rPr lang="en-US" smtClean="0"/>
-              <a:t>9/24/2021</a:t>
+              <a:t>10/11/2021</a:t>
             </a:fld>
             <a:endParaRPr lang="en-US"/>
           </a:p>
@@ -2109,7 +2112,7 @@
           <a:p>
             <a:fld id="{4BE22FE5-10EE-49E1-829B-6CE36DD4136F}" type="datetimeFigureOut">
               <a:rPr lang="en-US" smtClean="0"/>
-              <a:t>9/24/2021</a:t>
+              <a:t>10/11/2021</a:t>
             </a:fld>
             <a:endParaRPr lang="en-US"/>
           </a:p>
@@ -2420,7 +2423,7 @@
           <a:p>
             <a:fld id="{4BE22FE5-10EE-49E1-829B-6CE36DD4136F}" type="datetimeFigureOut">
               <a:rPr lang="en-US" smtClean="0"/>
-              <a:t>9/24/2021</a:t>
+              <a:t>10/11/2021</a:t>
             </a:fld>
             <a:endParaRPr lang="en-US"/>
           </a:p>
@@ -2708,7 +2711,7 @@
           <a:p>
             <a:fld id="{4BE22FE5-10EE-49E1-829B-6CE36DD4136F}" type="datetimeFigureOut">
               <a:rPr lang="en-US" smtClean="0"/>
-              <a:t>9/24/2021</a:t>
+              <a:t>10/11/2021</a:t>
             </a:fld>
             <a:endParaRPr lang="en-US"/>
           </a:p>
@@ -2949,7 +2952,7 @@
           <a:p>
             <a:fld id="{4BE22FE5-10EE-49E1-829B-6CE36DD4136F}" type="datetimeFigureOut">
               <a:rPr lang="en-US" smtClean="0"/>
-              <a:t>9/24/2021</a:t>
+              <a:t>10/11/2021</a:t>
             </a:fld>
             <a:endParaRPr lang="en-US"/>
           </a:p>
@@ -23419,6 +23422,1162 @@
 </p:sld>
 </file>
 
+<file path=ppt/slides/slide42.xml><?xml version="1.0" encoding="utf-8"?>
+<p:sld xmlns:a="http://schemas.openxmlformats.org/drawingml/2006/main" xmlns:r="http://schemas.openxmlformats.org/officeDocument/2006/relationships" xmlns:p="http://schemas.openxmlformats.org/presentationml/2006/main">
+  <p:cSld>
+    <p:spTree>
+      <p:nvGrpSpPr>
+        <p:cNvPr id="1" name=""/>
+        <p:cNvGrpSpPr/>
+        <p:nvPr/>
+      </p:nvGrpSpPr>
+      <p:grpSpPr>
+        <a:xfrm>
+          <a:off x="0" y="0"/>
+          <a:ext cx="0" cy="0"/>
+          <a:chOff x="0" y="0"/>
+          <a:chExt cx="0" cy="0"/>
+        </a:xfrm>
+      </p:grpSpPr>
+      <p:sp>
+        <p:nvSpPr>
+          <p:cNvPr id="2" name="Title 1">
+            <a:extLst>
+              <a:ext uri="{FF2B5EF4-FFF2-40B4-BE49-F238E27FC236}">
+                <a16:creationId xmlns:a16="http://schemas.microsoft.com/office/drawing/2014/main" id="{11356F73-9774-4829-B535-420BC25AA613}"/>
+              </a:ext>
+            </a:extLst>
+          </p:cNvPr>
+          <p:cNvSpPr>
+            <a:spLocks noGrp="1"/>
+          </p:cNvSpPr>
+          <p:nvPr>
+            <p:ph type="title"/>
+          </p:nvPr>
+        </p:nvSpPr>
+        <p:spPr/>
+        <p:txBody>
+          <a:bodyPr/>
+          <a:lstStyle/>
+          <a:p>
+            <a:r>
+              <a:rPr lang="en-IN" dirty="0"/>
+              <a:t>Dataset Stats</a:t>
+            </a:r>
+            <a:endParaRPr lang="en-US" dirty="0"/>
+          </a:p>
+        </p:txBody>
+      </p:sp>
+      <p:sp>
+        <p:nvSpPr>
+          <p:cNvPr id="3" name="Content Placeholder 2">
+            <a:extLst>
+              <a:ext uri="{FF2B5EF4-FFF2-40B4-BE49-F238E27FC236}">
+                <a16:creationId xmlns:a16="http://schemas.microsoft.com/office/drawing/2014/main" id="{9025308D-0385-43BC-A5C5-11B04D026624}"/>
+              </a:ext>
+            </a:extLst>
+          </p:cNvPr>
+          <p:cNvSpPr>
+            <a:spLocks noGrp="1"/>
+          </p:cNvSpPr>
+          <p:nvPr>
+            <p:ph idx="1"/>
+          </p:nvPr>
+        </p:nvSpPr>
+        <p:spPr/>
+        <p:txBody>
+          <a:bodyPr/>
+          <a:lstStyle/>
+          <a:p>
+            <a:r>
+              <a:rPr lang="en-IN" dirty="0"/>
+              <a:t>Total size: 9285</a:t>
+            </a:r>
+          </a:p>
+          <a:p>
+            <a:r>
+              <a:rPr lang="en-IN" dirty="0"/>
+              <a:t>Annotated samples: 8100</a:t>
+            </a:r>
+            <a:endParaRPr lang="en-US" dirty="0"/>
+          </a:p>
+        </p:txBody>
+      </p:sp>
+    </p:spTree>
+    <p:extLst>
+      <p:ext uri="{BB962C8B-B14F-4D97-AF65-F5344CB8AC3E}">
+        <p14:creationId xmlns:p14="http://schemas.microsoft.com/office/powerpoint/2010/main" val="1129402071"/>
+      </p:ext>
+    </p:extLst>
+  </p:cSld>
+  <p:clrMapOvr>
+    <a:masterClrMapping/>
+  </p:clrMapOvr>
+</p:sld>
+</file>
+
+<file path=ppt/slides/slide43.xml><?xml version="1.0" encoding="utf-8"?>
+<p:sld xmlns:a="http://schemas.openxmlformats.org/drawingml/2006/main" xmlns:r="http://schemas.openxmlformats.org/officeDocument/2006/relationships" xmlns:p="http://schemas.openxmlformats.org/presentationml/2006/main">
+  <p:cSld>
+    <p:spTree>
+      <p:nvGrpSpPr>
+        <p:cNvPr id="1" name=""/>
+        <p:cNvGrpSpPr/>
+        <p:nvPr/>
+      </p:nvGrpSpPr>
+      <p:grpSpPr>
+        <a:xfrm>
+          <a:off x="0" y="0"/>
+          <a:ext cx="0" cy="0"/>
+          <a:chOff x="0" y="0"/>
+          <a:chExt cx="0" cy="0"/>
+        </a:xfrm>
+      </p:grpSpPr>
+      <p:sp>
+        <p:nvSpPr>
+          <p:cNvPr id="2" name="Title 1">
+            <a:extLst>
+              <a:ext uri="{FF2B5EF4-FFF2-40B4-BE49-F238E27FC236}">
+                <a16:creationId xmlns:a16="http://schemas.microsoft.com/office/drawing/2014/main" id="{A15077C5-F9FA-4ECB-A818-A47C43913FBF}"/>
+              </a:ext>
+            </a:extLst>
+          </p:cNvPr>
+          <p:cNvSpPr>
+            <a:spLocks noGrp="1"/>
+          </p:cNvSpPr>
+          <p:nvPr>
+            <p:ph type="title"/>
+          </p:nvPr>
+        </p:nvSpPr>
+        <p:spPr/>
+        <p:txBody>
+          <a:bodyPr/>
+          <a:lstStyle/>
+          <a:p>
+            <a:r>
+              <a:rPr lang="en-IN" dirty="0" err="1"/>
+              <a:t>Bertqa</a:t>
+            </a:r>
+            <a:r>
+              <a:rPr lang="en-IN" dirty="0"/>
+              <a:t> analysis</a:t>
+            </a:r>
+            <a:endParaRPr lang="en-US" dirty="0"/>
+          </a:p>
+        </p:txBody>
+      </p:sp>
+      <p:sp>
+        <p:nvSpPr>
+          <p:cNvPr id="3" name="Content Placeholder 2">
+            <a:extLst>
+              <a:ext uri="{FF2B5EF4-FFF2-40B4-BE49-F238E27FC236}">
+                <a16:creationId xmlns:a16="http://schemas.microsoft.com/office/drawing/2014/main" id="{156705D4-4114-4A8F-BCF1-A6DDAC547AF8}"/>
+              </a:ext>
+            </a:extLst>
+          </p:cNvPr>
+          <p:cNvSpPr>
+            <a:spLocks noGrp="1"/>
+          </p:cNvSpPr>
+          <p:nvPr>
+            <p:ph idx="1"/>
+          </p:nvPr>
+        </p:nvSpPr>
+        <p:spPr>
+          <a:xfrm>
+            <a:off x="14683" y="1607331"/>
+            <a:ext cx="3087848" cy="4351338"/>
+          </a:xfrm>
+        </p:spPr>
+        <p:txBody>
+          <a:bodyPr>
+            <a:normAutofit fontScale="40000" lnSpcReduction="20000"/>
+          </a:bodyPr>
+          <a:lstStyle/>
+          <a:p>
+            <a:pPr marL="0" indent="0">
+              <a:buNone/>
+            </a:pPr>
+            <a:r>
+              <a:rPr lang="en-IN" dirty="0"/>
+              <a:t>Generated answer(200_tokens):</a:t>
+            </a:r>
+          </a:p>
+          <a:p>
+            <a:r>
+              <a:rPr lang="en-US" dirty="0"/>
+              <a:t>"Women account for more than a quarter ( 28 % ) of the </a:t>
+            </a:r>
+            <a:r>
+              <a:rPr lang="en-US" dirty="0">
+                <a:solidFill>
+                  <a:srgbClr val="FF0000"/>
+                </a:solidFill>
+                <a:highlight>
+                  <a:srgbClr val="FFFF00"/>
+                </a:highlight>
+              </a:rPr>
+              <a:t>67</a:t>
+            </a:r>
+            <a:r>
+              <a:rPr lang="en-US" dirty="0"/>
+              <a:t> judges President Donald Trump has successfully appointed to the federal courts since taking office . That ‘s well below the share appointed by Barack Obama - whose </a:t>
+            </a:r>
+            <a:r>
+              <a:rPr lang="en-US" dirty="0">
+                <a:solidFill>
+                  <a:srgbClr val="FF0000"/>
+                </a:solidFill>
+                <a:highlight>
+                  <a:srgbClr val="FFFF00"/>
+                </a:highlight>
+              </a:rPr>
+              <a:t>324</a:t>
+            </a:r>
+            <a:r>
+              <a:rPr lang="en-US" dirty="0"/>
+              <a:t> judicial appointees were a record 42 % female - but higher than the share appointed by any other Republican president , according to a Pew Research Center analysis of data from the Federal Judicial Center . In both parties , presidents have appointed a growing share of female judges in recent decades . Women represented 22 % of the </a:t>
+            </a:r>
+            <a:r>
+              <a:rPr lang="en-US" dirty="0">
+                <a:solidFill>
+                  <a:srgbClr val="FF0000"/>
+                </a:solidFill>
+                <a:highlight>
+                  <a:srgbClr val="FFFF00"/>
+                </a:highlight>
+              </a:rPr>
+              <a:t>324</a:t>
+            </a:r>
+            <a:r>
+              <a:rPr lang="en-US" dirty="0"/>
+              <a:t> judges appointed by Republican George W. Bush during his eight years in office , 19 % of the </a:t>
+            </a:r>
+            <a:r>
+              <a:rPr lang="en-US" dirty="0">
+                <a:solidFill>
+                  <a:srgbClr val="FF0000"/>
+                </a:solidFill>
+                <a:highlight>
+                  <a:srgbClr val="FFFF00"/>
+                </a:highlight>
+              </a:rPr>
+              <a:t>188</a:t>
+            </a:r>
+            <a:r>
+              <a:rPr lang="en-US" dirty="0"/>
+              <a:t> judges appointed by George H.W. Bush and 8 % of the </a:t>
+            </a:r>
+            <a:r>
+              <a:rPr lang="en-US" dirty="0">
+                <a:solidFill>
+                  <a:srgbClr val="FF0000"/>
+                </a:solidFill>
+                <a:highlight>
+                  <a:srgbClr val="FFFF00"/>
+                </a:highlight>
+              </a:rPr>
+              <a:t>364</a:t>
+            </a:r>
+            <a:r>
+              <a:rPr lang="en-US" dirty="0"/>
+              <a:t> judges appointed by Ronald Reagan . </a:t>
+            </a:r>
+            <a:r>
+              <a:rPr lang="en-US" dirty="0">
+                <a:solidFill>
+                  <a:srgbClr val="FF0000"/>
+                </a:solidFill>
+                <a:highlight>
+                  <a:srgbClr val="FFFF00"/>
+                </a:highlight>
+              </a:rPr>
+              <a:t>Among recent Democratic presidents , Obama ‘s total exceeded the share appointed by Bill Clinton ( 28 % of 372 judges ) and Jimmy Carter ( 16 %“</a:t>
+            </a:r>
+          </a:p>
+          <a:p>
+            <a:pPr marL="0" indent="0">
+              <a:buNone/>
+            </a:pPr>
+            <a:r>
+              <a:rPr lang="en-IN" dirty="0"/>
+              <a:t>Generated answer(200_tokens):</a:t>
+            </a:r>
+          </a:p>
+          <a:p>
+            <a:r>
+              <a:rPr lang="en-US" dirty="0">
+                <a:solidFill>
+                  <a:srgbClr val="FF0000"/>
+                </a:solidFill>
+                <a:highlight>
+                  <a:srgbClr val="FFFF00"/>
+                </a:highlight>
+              </a:rPr>
+              <a:t>Obama ’s total exceeded the share appointed by Bill Clinton ( 28 % of 372 judges ) and Jimmy Carter ( 16 %</a:t>
+            </a:r>
+          </a:p>
+          <a:p>
+            <a:endParaRPr lang="en-US" dirty="0">
+              <a:solidFill>
+                <a:srgbClr val="FF0000"/>
+              </a:solidFill>
+              <a:highlight>
+                <a:srgbClr val="FFFF00"/>
+              </a:highlight>
+            </a:endParaRPr>
+          </a:p>
+        </p:txBody>
+      </p:sp>
+      <p:sp>
+        <p:nvSpPr>
+          <p:cNvPr id="4" name="Content Placeholder 2">
+            <a:extLst>
+              <a:ext uri="{FF2B5EF4-FFF2-40B4-BE49-F238E27FC236}">
+                <a16:creationId xmlns:a16="http://schemas.microsoft.com/office/drawing/2014/main" id="{4B336C62-F1A1-4036-B40C-E831D1646E09}"/>
+              </a:ext>
+            </a:extLst>
+          </p:cNvPr>
+          <p:cNvSpPr txBox="1">
+            <a:spLocks/>
+          </p:cNvSpPr>
+          <p:nvPr/>
+        </p:nvSpPr>
+        <p:spPr>
+          <a:xfrm>
+            <a:off x="5847125" y="1505338"/>
+            <a:ext cx="3087848" cy="4789132"/>
+          </a:xfrm>
+          <a:prstGeom prst="rect">
+            <a:avLst/>
+          </a:prstGeom>
+        </p:spPr>
+        <p:txBody>
+          <a:bodyPr vert="horz" lIns="91440" tIns="45720" rIns="91440" bIns="45720" rtlCol="0">
+            <a:normAutofit fontScale="47500" lnSpcReduction="20000"/>
+          </a:bodyPr>
+          <a:lstStyle>
+            <a:lvl1pPr marL="228600" indent="-228600" algn="l" defTabSz="914400" rtl="0" eaLnBrk="1" latinLnBrk="0" hangingPunct="1">
+              <a:lnSpc>
+                <a:spcPct val="90000"/>
+              </a:lnSpc>
+              <a:spcBef>
+                <a:spcPts val="1000"/>
+              </a:spcBef>
+              <a:buFont typeface="Arial" panose="020B0604020202020204" pitchFamily="34" charset="0"/>
+              <a:buChar char="•"/>
+              <a:defRPr sz="2800" kern="1200">
+                <a:solidFill>
+                  <a:schemeClr val="tx1"/>
+                </a:solidFill>
+                <a:latin typeface="+mn-lt"/>
+                <a:ea typeface="+mn-ea"/>
+                <a:cs typeface="+mn-cs"/>
+              </a:defRPr>
+            </a:lvl1pPr>
+            <a:lvl2pPr marL="685800" indent="-228600" algn="l" defTabSz="914400" rtl="0" eaLnBrk="1" latinLnBrk="0" hangingPunct="1">
+              <a:lnSpc>
+                <a:spcPct val="90000"/>
+              </a:lnSpc>
+              <a:spcBef>
+                <a:spcPts val="500"/>
+              </a:spcBef>
+              <a:buFont typeface="Arial" panose="020B0604020202020204" pitchFamily="34" charset="0"/>
+              <a:buChar char="•"/>
+              <a:defRPr sz="2400" kern="1200">
+                <a:solidFill>
+                  <a:schemeClr val="tx1"/>
+                </a:solidFill>
+                <a:latin typeface="+mn-lt"/>
+                <a:ea typeface="+mn-ea"/>
+                <a:cs typeface="+mn-cs"/>
+              </a:defRPr>
+            </a:lvl2pPr>
+            <a:lvl3pPr marL="1143000" indent="-228600" algn="l" defTabSz="914400" rtl="0" eaLnBrk="1" latinLnBrk="0" hangingPunct="1">
+              <a:lnSpc>
+                <a:spcPct val="90000"/>
+              </a:lnSpc>
+              <a:spcBef>
+                <a:spcPts val="500"/>
+              </a:spcBef>
+              <a:buFont typeface="Arial" panose="020B0604020202020204" pitchFamily="34" charset="0"/>
+              <a:buChar char="•"/>
+              <a:defRPr sz="2000" kern="1200">
+                <a:solidFill>
+                  <a:schemeClr val="tx1"/>
+                </a:solidFill>
+                <a:latin typeface="+mn-lt"/>
+                <a:ea typeface="+mn-ea"/>
+                <a:cs typeface="+mn-cs"/>
+              </a:defRPr>
+            </a:lvl3pPr>
+            <a:lvl4pPr marL="1600200" indent="-228600" algn="l" defTabSz="914400" rtl="0" eaLnBrk="1" latinLnBrk="0" hangingPunct="1">
+              <a:lnSpc>
+                <a:spcPct val="90000"/>
+              </a:lnSpc>
+              <a:spcBef>
+                <a:spcPts val="500"/>
+              </a:spcBef>
+              <a:buFont typeface="Arial" panose="020B0604020202020204" pitchFamily="34" charset="0"/>
+              <a:buChar char="•"/>
+              <a:defRPr sz="1800" kern="1200">
+                <a:solidFill>
+                  <a:schemeClr val="tx1"/>
+                </a:solidFill>
+                <a:latin typeface="+mn-lt"/>
+                <a:ea typeface="+mn-ea"/>
+                <a:cs typeface="+mn-cs"/>
+              </a:defRPr>
+            </a:lvl4pPr>
+            <a:lvl5pPr marL="2057400" indent="-228600" algn="l" defTabSz="914400" rtl="0" eaLnBrk="1" latinLnBrk="0" hangingPunct="1">
+              <a:lnSpc>
+                <a:spcPct val="90000"/>
+              </a:lnSpc>
+              <a:spcBef>
+                <a:spcPts val="500"/>
+              </a:spcBef>
+              <a:buFont typeface="Arial" panose="020B0604020202020204" pitchFamily="34" charset="0"/>
+              <a:buChar char="•"/>
+              <a:defRPr sz="1800" kern="1200">
+                <a:solidFill>
+                  <a:schemeClr val="tx1"/>
+                </a:solidFill>
+                <a:latin typeface="+mn-lt"/>
+                <a:ea typeface="+mn-ea"/>
+                <a:cs typeface="+mn-cs"/>
+              </a:defRPr>
+            </a:lvl5pPr>
+            <a:lvl6pPr marL="2514600" indent="-228600" algn="l" defTabSz="914400" rtl="0" eaLnBrk="1" latinLnBrk="0" hangingPunct="1">
+              <a:lnSpc>
+                <a:spcPct val="90000"/>
+              </a:lnSpc>
+              <a:spcBef>
+                <a:spcPts val="500"/>
+              </a:spcBef>
+              <a:buFont typeface="Arial" panose="020B0604020202020204" pitchFamily="34" charset="0"/>
+              <a:buChar char="•"/>
+              <a:defRPr sz="1800" kern="1200">
+                <a:solidFill>
+                  <a:schemeClr val="tx1"/>
+                </a:solidFill>
+                <a:latin typeface="+mn-lt"/>
+                <a:ea typeface="+mn-ea"/>
+                <a:cs typeface="+mn-cs"/>
+              </a:defRPr>
+            </a:lvl6pPr>
+            <a:lvl7pPr marL="2971800" indent="-228600" algn="l" defTabSz="914400" rtl="0" eaLnBrk="1" latinLnBrk="0" hangingPunct="1">
+              <a:lnSpc>
+                <a:spcPct val="90000"/>
+              </a:lnSpc>
+              <a:spcBef>
+                <a:spcPts val="500"/>
+              </a:spcBef>
+              <a:buFont typeface="Arial" panose="020B0604020202020204" pitchFamily="34" charset="0"/>
+              <a:buChar char="•"/>
+              <a:defRPr sz="1800" kern="1200">
+                <a:solidFill>
+                  <a:schemeClr val="tx1"/>
+                </a:solidFill>
+                <a:latin typeface="+mn-lt"/>
+                <a:ea typeface="+mn-ea"/>
+                <a:cs typeface="+mn-cs"/>
+              </a:defRPr>
+            </a:lvl7pPr>
+            <a:lvl8pPr marL="3429000" indent="-228600" algn="l" defTabSz="914400" rtl="0" eaLnBrk="1" latinLnBrk="0" hangingPunct="1">
+              <a:lnSpc>
+                <a:spcPct val="90000"/>
+              </a:lnSpc>
+              <a:spcBef>
+                <a:spcPts val="500"/>
+              </a:spcBef>
+              <a:buFont typeface="Arial" panose="020B0604020202020204" pitchFamily="34" charset="0"/>
+              <a:buChar char="•"/>
+              <a:defRPr sz="1800" kern="1200">
+                <a:solidFill>
+                  <a:schemeClr val="tx1"/>
+                </a:solidFill>
+                <a:latin typeface="+mn-lt"/>
+                <a:ea typeface="+mn-ea"/>
+                <a:cs typeface="+mn-cs"/>
+              </a:defRPr>
+            </a:lvl8pPr>
+            <a:lvl9pPr marL="3886200" indent="-228600" algn="l" defTabSz="914400" rtl="0" eaLnBrk="1" latinLnBrk="0" hangingPunct="1">
+              <a:lnSpc>
+                <a:spcPct val="90000"/>
+              </a:lnSpc>
+              <a:spcBef>
+                <a:spcPts val="500"/>
+              </a:spcBef>
+              <a:buFont typeface="Arial" panose="020B0604020202020204" pitchFamily="34" charset="0"/>
+              <a:buChar char="•"/>
+              <a:defRPr sz="1800" kern="1200">
+                <a:solidFill>
+                  <a:schemeClr val="tx1"/>
+                </a:solidFill>
+                <a:latin typeface="+mn-lt"/>
+                <a:ea typeface="+mn-ea"/>
+                <a:cs typeface="+mn-cs"/>
+              </a:defRPr>
+            </a:lvl9pPr>
+          </a:lstStyle>
+          <a:p>
+            <a:pPr marL="0" indent="0">
+              <a:buFont typeface="Arial" panose="020B0604020202020204" pitchFamily="34" charset="0"/>
+              <a:buNone/>
+            </a:pPr>
+            <a:r>
+              <a:rPr lang="en-IN" dirty="0"/>
+              <a:t>Summary</a:t>
+            </a:r>
+          </a:p>
+          <a:p>
+            <a:r>
+              <a:rPr lang="en-US" dirty="0"/>
+              <a:t>Women account for more than a quarter ( 28 % ) of the </a:t>
+            </a:r>
+            <a:r>
+              <a:rPr lang="en-US" dirty="0">
+                <a:solidFill>
+                  <a:srgbClr val="FF0000"/>
+                </a:solidFill>
+                <a:highlight>
+                  <a:srgbClr val="FFFF00"/>
+                </a:highlight>
+              </a:rPr>
+              <a:t>67</a:t>
+            </a:r>
+            <a:r>
+              <a:rPr lang="en-US" dirty="0"/>
+              <a:t> judges President Donald Trump has successfully appointed to the federal courts since taking office . That ’s well below the share appointed by Barack Obama – whose </a:t>
+            </a:r>
+            <a:r>
+              <a:rPr lang="en-US" dirty="0">
+                <a:solidFill>
+                  <a:srgbClr val="FF0000"/>
+                </a:solidFill>
+                <a:highlight>
+                  <a:srgbClr val="FFFF00"/>
+                </a:highlight>
+              </a:rPr>
+              <a:t>324</a:t>
+            </a:r>
+            <a:r>
+              <a:rPr lang="en-US" dirty="0"/>
+              <a:t> judicial appointees were a record 42 % female – but higher than the share appointed by any other Republican president , according to a Pew Research Center analysis of data from the Federal Judicial Center . In both parties , presidents have appointed a growing share of female judges in recent decades . Women represented 22 % of the  </a:t>
+            </a:r>
+            <a:r>
+              <a:rPr lang="en-US" dirty="0">
+                <a:solidFill>
+                  <a:srgbClr val="FF0000"/>
+                </a:solidFill>
+                <a:highlight>
+                  <a:srgbClr val="FFFF00"/>
+                </a:highlight>
+              </a:rPr>
+              <a:t>324</a:t>
+            </a:r>
+            <a:r>
+              <a:rPr lang="en-US" dirty="0"/>
+              <a:t>  judges appointed by Republican George W. Bush during his eight years in office , 19 % of the </a:t>
+            </a:r>
+            <a:r>
+              <a:rPr lang="en-US" dirty="0">
+                <a:solidFill>
+                  <a:srgbClr val="FF0000"/>
+                </a:solidFill>
+                <a:highlight>
+                  <a:srgbClr val="FFFF00"/>
+                </a:highlight>
+              </a:rPr>
+              <a:t>188</a:t>
+            </a:r>
+            <a:r>
+              <a:rPr lang="en-US" dirty="0"/>
+              <a:t> judges appointed by George H.W. Bush and 8 % of the </a:t>
+            </a:r>
+            <a:r>
+              <a:rPr lang="en-US" dirty="0">
+                <a:solidFill>
+                  <a:srgbClr val="FF0000"/>
+                </a:solidFill>
+                <a:highlight>
+                  <a:srgbClr val="FFFF00"/>
+                </a:highlight>
+              </a:rPr>
+              <a:t>364</a:t>
+            </a:r>
+            <a:r>
+              <a:rPr lang="en-US" dirty="0"/>
+              <a:t> judges appointed by Ronald Reagan .</a:t>
+            </a:r>
+          </a:p>
+          <a:p>
+            <a:r>
+              <a:rPr lang="en-US" dirty="0"/>
+              <a:t>Title: "Trump has appointed a greater share of women judges than any other Republican presidents“</a:t>
+            </a:r>
+          </a:p>
+          <a:p>
+            <a:r>
+              <a:rPr lang="en-US" dirty="0"/>
+              <a:t>Question: "What are the women's thoughts on the government?"</a:t>
+            </a:r>
+          </a:p>
+        </p:txBody>
+      </p:sp>
+      <p:sp>
+        <p:nvSpPr>
+          <p:cNvPr id="5" name="Content Placeholder 2">
+            <a:extLst>
+              <a:ext uri="{FF2B5EF4-FFF2-40B4-BE49-F238E27FC236}">
+                <a16:creationId xmlns:a16="http://schemas.microsoft.com/office/drawing/2014/main" id="{F7B7FCD3-D452-4382-B36E-E636884CF9A0}"/>
+              </a:ext>
+            </a:extLst>
+          </p:cNvPr>
+          <p:cNvSpPr txBox="1">
+            <a:spLocks/>
+          </p:cNvSpPr>
+          <p:nvPr/>
+        </p:nvSpPr>
+        <p:spPr>
+          <a:xfrm>
+            <a:off x="8846535" y="1598806"/>
+            <a:ext cx="3087848" cy="4351338"/>
+          </a:xfrm>
+          <a:prstGeom prst="rect">
+            <a:avLst/>
+          </a:prstGeom>
+        </p:spPr>
+        <p:txBody>
+          <a:bodyPr vert="horz" lIns="91440" tIns="45720" rIns="91440" bIns="45720" rtlCol="0">
+            <a:normAutofit fontScale="55000" lnSpcReduction="20000"/>
+          </a:bodyPr>
+          <a:lstStyle>
+            <a:lvl1pPr marL="228600" indent="-228600" algn="l" defTabSz="914400" rtl="0" eaLnBrk="1" latinLnBrk="0" hangingPunct="1">
+              <a:lnSpc>
+                <a:spcPct val="90000"/>
+              </a:lnSpc>
+              <a:spcBef>
+                <a:spcPts val="1000"/>
+              </a:spcBef>
+              <a:buFont typeface="Arial" panose="020B0604020202020204" pitchFamily="34" charset="0"/>
+              <a:buChar char="•"/>
+              <a:defRPr sz="2800" kern="1200">
+                <a:solidFill>
+                  <a:schemeClr val="tx1"/>
+                </a:solidFill>
+                <a:latin typeface="+mn-lt"/>
+                <a:ea typeface="+mn-ea"/>
+                <a:cs typeface="+mn-cs"/>
+              </a:defRPr>
+            </a:lvl1pPr>
+            <a:lvl2pPr marL="685800" indent="-228600" algn="l" defTabSz="914400" rtl="0" eaLnBrk="1" latinLnBrk="0" hangingPunct="1">
+              <a:lnSpc>
+                <a:spcPct val="90000"/>
+              </a:lnSpc>
+              <a:spcBef>
+                <a:spcPts val="500"/>
+              </a:spcBef>
+              <a:buFont typeface="Arial" panose="020B0604020202020204" pitchFamily="34" charset="0"/>
+              <a:buChar char="•"/>
+              <a:defRPr sz="2400" kern="1200">
+                <a:solidFill>
+                  <a:schemeClr val="tx1"/>
+                </a:solidFill>
+                <a:latin typeface="+mn-lt"/>
+                <a:ea typeface="+mn-ea"/>
+                <a:cs typeface="+mn-cs"/>
+              </a:defRPr>
+            </a:lvl2pPr>
+            <a:lvl3pPr marL="1143000" indent="-228600" algn="l" defTabSz="914400" rtl="0" eaLnBrk="1" latinLnBrk="0" hangingPunct="1">
+              <a:lnSpc>
+                <a:spcPct val="90000"/>
+              </a:lnSpc>
+              <a:spcBef>
+                <a:spcPts val="500"/>
+              </a:spcBef>
+              <a:buFont typeface="Arial" panose="020B0604020202020204" pitchFamily="34" charset="0"/>
+              <a:buChar char="•"/>
+              <a:defRPr sz="2000" kern="1200">
+                <a:solidFill>
+                  <a:schemeClr val="tx1"/>
+                </a:solidFill>
+                <a:latin typeface="+mn-lt"/>
+                <a:ea typeface="+mn-ea"/>
+                <a:cs typeface="+mn-cs"/>
+              </a:defRPr>
+            </a:lvl3pPr>
+            <a:lvl4pPr marL="1600200" indent="-228600" algn="l" defTabSz="914400" rtl="0" eaLnBrk="1" latinLnBrk="0" hangingPunct="1">
+              <a:lnSpc>
+                <a:spcPct val="90000"/>
+              </a:lnSpc>
+              <a:spcBef>
+                <a:spcPts val="500"/>
+              </a:spcBef>
+              <a:buFont typeface="Arial" panose="020B0604020202020204" pitchFamily="34" charset="0"/>
+              <a:buChar char="•"/>
+              <a:defRPr sz="1800" kern="1200">
+                <a:solidFill>
+                  <a:schemeClr val="tx1"/>
+                </a:solidFill>
+                <a:latin typeface="+mn-lt"/>
+                <a:ea typeface="+mn-ea"/>
+                <a:cs typeface="+mn-cs"/>
+              </a:defRPr>
+            </a:lvl4pPr>
+            <a:lvl5pPr marL="2057400" indent="-228600" algn="l" defTabSz="914400" rtl="0" eaLnBrk="1" latinLnBrk="0" hangingPunct="1">
+              <a:lnSpc>
+                <a:spcPct val="90000"/>
+              </a:lnSpc>
+              <a:spcBef>
+                <a:spcPts val="500"/>
+              </a:spcBef>
+              <a:buFont typeface="Arial" panose="020B0604020202020204" pitchFamily="34" charset="0"/>
+              <a:buChar char="•"/>
+              <a:defRPr sz="1800" kern="1200">
+                <a:solidFill>
+                  <a:schemeClr val="tx1"/>
+                </a:solidFill>
+                <a:latin typeface="+mn-lt"/>
+                <a:ea typeface="+mn-ea"/>
+                <a:cs typeface="+mn-cs"/>
+              </a:defRPr>
+            </a:lvl5pPr>
+            <a:lvl6pPr marL="2514600" indent="-228600" algn="l" defTabSz="914400" rtl="0" eaLnBrk="1" latinLnBrk="0" hangingPunct="1">
+              <a:lnSpc>
+                <a:spcPct val="90000"/>
+              </a:lnSpc>
+              <a:spcBef>
+                <a:spcPts val="500"/>
+              </a:spcBef>
+              <a:buFont typeface="Arial" panose="020B0604020202020204" pitchFamily="34" charset="0"/>
+              <a:buChar char="•"/>
+              <a:defRPr sz="1800" kern="1200">
+                <a:solidFill>
+                  <a:schemeClr val="tx1"/>
+                </a:solidFill>
+                <a:latin typeface="+mn-lt"/>
+                <a:ea typeface="+mn-ea"/>
+                <a:cs typeface="+mn-cs"/>
+              </a:defRPr>
+            </a:lvl6pPr>
+            <a:lvl7pPr marL="2971800" indent="-228600" algn="l" defTabSz="914400" rtl="0" eaLnBrk="1" latinLnBrk="0" hangingPunct="1">
+              <a:lnSpc>
+                <a:spcPct val="90000"/>
+              </a:lnSpc>
+              <a:spcBef>
+                <a:spcPts val="500"/>
+              </a:spcBef>
+              <a:buFont typeface="Arial" panose="020B0604020202020204" pitchFamily="34" charset="0"/>
+              <a:buChar char="•"/>
+              <a:defRPr sz="1800" kern="1200">
+                <a:solidFill>
+                  <a:schemeClr val="tx1"/>
+                </a:solidFill>
+                <a:latin typeface="+mn-lt"/>
+                <a:ea typeface="+mn-ea"/>
+                <a:cs typeface="+mn-cs"/>
+              </a:defRPr>
+            </a:lvl7pPr>
+            <a:lvl8pPr marL="3429000" indent="-228600" algn="l" defTabSz="914400" rtl="0" eaLnBrk="1" latinLnBrk="0" hangingPunct="1">
+              <a:lnSpc>
+                <a:spcPct val="90000"/>
+              </a:lnSpc>
+              <a:spcBef>
+                <a:spcPts val="500"/>
+              </a:spcBef>
+              <a:buFont typeface="Arial" panose="020B0604020202020204" pitchFamily="34" charset="0"/>
+              <a:buChar char="•"/>
+              <a:defRPr sz="1800" kern="1200">
+                <a:solidFill>
+                  <a:schemeClr val="tx1"/>
+                </a:solidFill>
+                <a:latin typeface="+mn-lt"/>
+                <a:ea typeface="+mn-ea"/>
+                <a:cs typeface="+mn-cs"/>
+              </a:defRPr>
+            </a:lvl8pPr>
+            <a:lvl9pPr marL="3886200" indent="-228600" algn="l" defTabSz="914400" rtl="0" eaLnBrk="1" latinLnBrk="0" hangingPunct="1">
+              <a:lnSpc>
+                <a:spcPct val="90000"/>
+              </a:lnSpc>
+              <a:spcBef>
+                <a:spcPts val="500"/>
+              </a:spcBef>
+              <a:buFont typeface="Arial" panose="020B0604020202020204" pitchFamily="34" charset="0"/>
+              <a:buChar char="•"/>
+              <a:defRPr sz="1800" kern="1200">
+                <a:solidFill>
+                  <a:schemeClr val="tx1"/>
+                </a:solidFill>
+                <a:latin typeface="+mn-lt"/>
+                <a:ea typeface="+mn-ea"/>
+                <a:cs typeface="+mn-cs"/>
+              </a:defRPr>
+            </a:lvl9pPr>
+          </a:lstStyle>
+          <a:p>
+            <a:pPr marL="0" indent="0">
+              <a:buFont typeface="Arial" panose="020B0604020202020204" pitchFamily="34" charset="0"/>
+              <a:buNone/>
+            </a:pPr>
+            <a:r>
+              <a:rPr lang="en-IN" dirty="0"/>
+              <a:t>(Target)Extractive answer:</a:t>
+            </a:r>
+          </a:p>
+          <a:p>
+            <a:r>
+              <a:rPr lang="en-US" dirty="0"/>
+              <a:t>"Women account for more than a quarter ( 28 % ) of the judges President Donald Trump has successfully appointed to the federal courts since taking office . That ’s well below the share appointed by Barack Obama – whose judicial appointees were a record 42 % female – but higher than the share appointed by any other Republican president , according to a Pew Research Center analysis of data from the Federal Judicial Center . In both parties , presidents have appointed a growing share of female judges in recent decades . Women represented 22 % of the judges appointed by Republican George W. Bush during his eight years in office , 19 % of the judges appointed by George H.W. Bush and 8 % of the judges appointed by Ronald Reagan ."</a:t>
+            </a:r>
+          </a:p>
+        </p:txBody>
+      </p:sp>
+      <p:pic>
+        <p:nvPicPr>
+          <p:cNvPr id="9" name="Picture 8">
+            <a:extLst>
+              <a:ext uri="{FF2B5EF4-FFF2-40B4-BE49-F238E27FC236}">
+                <a16:creationId xmlns:a16="http://schemas.microsoft.com/office/drawing/2014/main" id="{CE873E00-5EE8-42DA-B55B-6202CD303A6C}"/>
+              </a:ext>
+            </a:extLst>
+          </p:cNvPr>
+          <p:cNvPicPr>
+            <a:picLocks noChangeAspect="1"/>
+          </p:cNvPicPr>
+          <p:nvPr/>
+        </p:nvPicPr>
+        <p:blipFill>
+          <a:blip r:embed="rId2"/>
+          <a:stretch>
+            <a:fillRect/>
+          </a:stretch>
+        </p:blipFill>
+        <p:spPr>
+          <a:xfrm>
+            <a:off x="3102531" y="1505338"/>
+            <a:ext cx="2656156" cy="4352924"/>
+          </a:xfrm>
+          <a:prstGeom prst="rect">
+            <a:avLst/>
+          </a:prstGeom>
+        </p:spPr>
+      </p:pic>
+    </p:spTree>
+    <p:extLst>
+      <p:ext uri="{BB962C8B-B14F-4D97-AF65-F5344CB8AC3E}">
+        <p14:creationId xmlns:p14="http://schemas.microsoft.com/office/powerpoint/2010/main" val="2926787908"/>
+      </p:ext>
+    </p:extLst>
+  </p:cSld>
+  <p:clrMapOvr>
+    <a:masterClrMapping/>
+  </p:clrMapOvr>
+</p:sld>
+</file>
+
+<file path=ppt/slides/slide44.xml><?xml version="1.0" encoding="utf-8"?>
+<p:sld xmlns:a="http://schemas.openxmlformats.org/drawingml/2006/main" xmlns:r="http://schemas.openxmlformats.org/officeDocument/2006/relationships" xmlns:p="http://schemas.openxmlformats.org/presentationml/2006/main">
+  <p:cSld>
+    <p:spTree>
+      <p:nvGrpSpPr>
+        <p:cNvPr id="1" name=""/>
+        <p:cNvGrpSpPr/>
+        <p:nvPr/>
+      </p:nvGrpSpPr>
+      <p:grpSpPr>
+        <a:xfrm>
+          <a:off x="0" y="0"/>
+          <a:ext cx="0" cy="0"/>
+          <a:chOff x="0" y="0"/>
+          <a:chExt cx="0" cy="0"/>
+        </a:xfrm>
+      </p:grpSpPr>
+      <p:sp>
+        <p:nvSpPr>
+          <p:cNvPr id="2" name="Title 1">
+            <a:extLst>
+              <a:ext uri="{FF2B5EF4-FFF2-40B4-BE49-F238E27FC236}">
+                <a16:creationId xmlns:a16="http://schemas.microsoft.com/office/drawing/2014/main" id="{796108A5-9981-45B0-BB58-6006CBE496DA}"/>
+              </a:ext>
+            </a:extLst>
+          </p:cNvPr>
+          <p:cNvSpPr>
+            <a:spLocks noGrp="1"/>
+          </p:cNvSpPr>
+          <p:nvPr>
+            <p:ph type="title"/>
+          </p:nvPr>
+        </p:nvSpPr>
+        <p:spPr/>
+        <p:txBody>
+          <a:bodyPr/>
+          <a:lstStyle/>
+          <a:p>
+            <a:r>
+              <a:rPr lang="en-IN" dirty="0"/>
+              <a:t>Document grounded Generation</a:t>
+            </a:r>
+            <a:endParaRPr lang="en-US" dirty="0"/>
+          </a:p>
+        </p:txBody>
+      </p:sp>
+      <p:pic>
+        <p:nvPicPr>
+          <p:cNvPr id="5" name="Content Placeholder 4">
+            <a:extLst>
+              <a:ext uri="{FF2B5EF4-FFF2-40B4-BE49-F238E27FC236}">
+                <a16:creationId xmlns:a16="http://schemas.microsoft.com/office/drawing/2014/main" id="{3BAB3B40-5E73-42E6-BC93-7BC689706116}"/>
+              </a:ext>
+            </a:extLst>
+          </p:cNvPr>
+          <p:cNvPicPr>
+            <a:picLocks noGrp="1" noChangeAspect="1"/>
+          </p:cNvPicPr>
+          <p:nvPr>
+            <p:ph idx="1"/>
+          </p:nvPr>
+        </p:nvPicPr>
+        <p:blipFill>
+          <a:blip r:embed="rId2"/>
+          <a:stretch>
+            <a:fillRect/>
+          </a:stretch>
+        </p:blipFill>
+        <p:spPr>
+          <a:xfrm>
+            <a:off x="1395243" y="1204819"/>
+            <a:ext cx="6162675" cy="2800350"/>
+          </a:xfrm>
+        </p:spPr>
+      </p:pic>
+      <p:sp>
+        <p:nvSpPr>
+          <p:cNvPr id="6" name="TextBox 5">
+            <a:extLst>
+              <a:ext uri="{FF2B5EF4-FFF2-40B4-BE49-F238E27FC236}">
+                <a16:creationId xmlns:a16="http://schemas.microsoft.com/office/drawing/2014/main" id="{986B9A7F-E8E4-4863-A667-9A7DE085BF9C}"/>
+              </a:ext>
+            </a:extLst>
+          </p:cNvPr>
+          <p:cNvSpPr txBox="1"/>
+          <p:nvPr/>
+        </p:nvSpPr>
+        <p:spPr>
+          <a:xfrm>
+            <a:off x="8786768" y="511728"/>
+            <a:ext cx="2567032" cy="7294305"/>
+          </a:xfrm>
+          <a:prstGeom prst="rect">
+            <a:avLst/>
+          </a:prstGeom>
+          <a:noFill/>
+        </p:spPr>
+        <p:txBody>
+          <a:bodyPr wrap="square" rtlCol="0">
+            <a:spAutoFit/>
+          </a:bodyPr>
+          <a:lstStyle/>
+          <a:p>
+            <a:r>
+              <a:rPr lang="en-US" dirty="0" err="1"/>
+              <a:t>hd</a:t>
+            </a:r>
+            <a:r>
+              <a:rPr lang="en-US" dirty="0"/>
+              <a:t> = </a:t>
+            </a:r>
+            <a:r>
+              <a:rPr lang="en-US" dirty="0" err="1"/>
+              <a:t>BARTEncoder</a:t>
+            </a:r>
+            <a:r>
+              <a:rPr lang="en-US" dirty="0"/>
+              <a:t>([ci ; di ]) </a:t>
+            </a:r>
+          </a:p>
+          <a:p>
+            <a:r>
+              <a:rPr lang="en-US" dirty="0" err="1"/>
+              <a:t>hc</a:t>
+            </a:r>
+            <a:r>
+              <a:rPr lang="en-US" dirty="0"/>
+              <a:t> = </a:t>
+            </a:r>
+            <a:r>
+              <a:rPr lang="en-US" dirty="0" err="1"/>
+              <a:t>BARTEncoder</a:t>
+            </a:r>
+            <a:r>
+              <a:rPr lang="en-US" dirty="0"/>
+              <a:t>(ci)</a:t>
+            </a:r>
+          </a:p>
+          <a:p>
+            <a:r>
+              <a:rPr lang="en-US" dirty="0"/>
+              <a:t>h = [</a:t>
+            </a:r>
+            <a:r>
+              <a:rPr lang="en-US" dirty="0" err="1"/>
+              <a:t>hc</a:t>
+            </a:r>
+            <a:r>
+              <a:rPr lang="en-US" dirty="0"/>
+              <a:t>; </a:t>
+            </a:r>
+            <a:r>
+              <a:rPr lang="en-US" dirty="0" err="1"/>
+              <a:t>hd</a:t>
+            </a:r>
+            <a:r>
+              <a:rPr lang="en-US" dirty="0"/>
+              <a:t>]</a:t>
+            </a:r>
+          </a:p>
+          <a:p>
+            <a:r>
+              <a:rPr lang="en-US" dirty="0" err="1"/>
+              <a:t>BARTDecoder</a:t>
+            </a:r>
+            <a:r>
+              <a:rPr lang="en-US" dirty="0"/>
+              <a:t>(h)</a:t>
+            </a:r>
+          </a:p>
+          <a:p>
+            <a:r>
+              <a:rPr lang="en-US" dirty="0"/>
+              <a:t>	(ci-context </a:t>
+            </a:r>
+            <a:r>
+              <a:rPr lang="en-US" dirty="0" err="1"/>
+              <a:t>i</a:t>
+            </a:r>
+            <a:r>
+              <a:rPr lang="en-US" dirty="0"/>
+              <a:t>,</a:t>
+            </a:r>
+          </a:p>
+          <a:p>
+            <a:r>
+              <a:rPr lang="en-US" dirty="0"/>
+              <a:t>	di-document </a:t>
+            </a:r>
+            <a:r>
+              <a:rPr lang="en-US" dirty="0" err="1"/>
+              <a:t>i</a:t>
+            </a:r>
+            <a:r>
+              <a:rPr lang="en-US" dirty="0"/>
+              <a:t>)</a:t>
+            </a:r>
+          </a:p>
+          <a:p>
+            <a:endParaRPr lang="en-US" dirty="0"/>
+          </a:p>
+          <a:p>
+            <a:r>
+              <a:rPr lang="en-US" dirty="0"/>
+              <a:t>Note: the context sets the background while the document provides the content necessary to generate the text.</a:t>
+            </a:r>
+          </a:p>
+          <a:p>
+            <a:endParaRPr lang="en-US" dirty="0"/>
+          </a:p>
+          <a:p>
+            <a:r>
+              <a:rPr lang="en-US" dirty="0"/>
+              <a:t>Training setup:</a:t>
+            </a:r>
+          </a:p>
+          <a:p>
+            <a:r>
+              <a:rPr lang="en-US" dirty="0"/>
+              <a:t>(580,000 samples, </a:t>
+            </a:r>
+            <a:r>
+              <a:rPr lang="en-US" dirty="0" err="1"/>
+              <a:t>batch_size</a:t>
+            </a:r>
+            <a:r>
+              <a:rPr lang="en-US" dirty="0"/>
+              <a:t> :2,epochs:25,</a:t>
+            </a:r>
+          </a:p>
+          <a:p>
+            <a:r>
+              <a:rPr lang="en-US" dirty="0"/>
+              <a:t>Surce_len:1024,target_len:128, 15 days training)</a:t>
+            </a:r>
+          </a:p>
+          <a:p>
+            <a:endParaRPr lang="en-US" dirty="0"/>
+          </a:p>
+          <a:p>
+            <a:endParaRPr lang="en-US" dirty="0"/>
+          </a:p>
+          <a:p>
+            <a:endParaRPr lang="en-US" dirty="0"/>
+          </a:p>
+          <a:p>
+            <a:endParaRPr lang="en-US" dirty="0"/>
+          </a:p>
+          <a:p>
+            <a:endParaRPr lang="en-US" dirty="0"/>
+          </a:p>
+          <a:p>
+            <a:endParaRPr lang="en-US" dirty="0"/>
+          </a:p>
+          <a:p>
+            <a:endParaRPr lang="en-US" dirty="0"/>
+          </a:p>
+        </p:txBody>
+      </p:sp>
+      <p:pic>
+        <p:nvPicPr>
+          <p:cNvPr id="8" name="Picture 7">
+            <a:extLst>
+              <a:ext uri="{FF2B5EF4-FFF2-40B4-BE49-F238E27FC236}">
+                <a16:creationId xmlns:a16="http://schemas.microsoft.com/office/drawing/2014/main" id="{5C980F31-B56D-4D1F-A6DA-832A946CE61E}"/>
+              </a:ext>
+            </a:extLst>
+          </p:cNvPr>
+          <p:cNvPicPr>
+            <a:picLocks noChangeAspect="1"/>
+          </p:cNvPicPr>
+          <p:nvPr/>
+        </p:nvPicPr>
+        <p:blipFill>
+          <a:blip r:embed="rId3"/>
+          <a:stretch>
+            <a:fillRect/>
+          </a:stretch>
+        </p:blipFill>
+        <p:spPr>
+          <a:xfrm>
+            <a:off x="2602800" y="4005169"/>
+            <a:ext cx="4037996" cy="2765929"/>
+          </a:xfrm>
+          <a:prstGeom prst="rect">
+            <a:avLst/>
+          </a:prstGeom>
+        </p:spPr>
+      </p:pic>
+    </p:spTree>
+    <p:extLst>
+      <p:ext uri="{BB962C8B-B14F-4D97-AF65-F5344CB8AC3E}">
+        <p14:creationId xmlns:p14="http://schemas.microsoft.com/office/powerpoint/2010/main" val="942947099"/>
+      </p:ext>
+    </p:extLst>
+  </p:cSld>
+  <p:clrMapOvr>
+    <a:masterClrMapping/>
+  </p:clrMapOvr>
+</p:sld>
+</file>
+
 <file path=ppt/slides/slide5.xml><?xml version="1.0" encoding="utf-8"?>
 <p:sld xmlns:a="http://schemas.openxmlformats.org/drawingml/2006/main" xmlns:r="http://schemas.openxmlformats.org/officeDocument/2006/relationships" xmlns:p="http://schemas.openxmlformats.org/presentationml/2006/main">
   <p:cSld>

</xml_diff>